<commit_message>
Started 1st level dfd
</commit_message>
<xml_diff>
--- a/report/Context for FMS.pptx
+++ b/report/Context for FMS.pptx
@@ -6,6 +6,7 @@
   </p:sldMasterIdLst>
   <p:sldIdLst>
     <p:sldId id="256" r:id="rId2"/>
+    <p:sldId id="258" r:id="rId3"/>
   </p:sldIdLst>
   <p:sldSz cx="9144000" cy="6858000" type="screen4x3"/>
   <p:notesSz cx="6858000" cy="9144000"/>
@@ -288,6 +289,7 @@
           <a:p>
             <a:fld id="{8623F981-5450-4885-8B10-CA221A48D640}" type="datetimeFigureOut">
               <a:rPr lang="en-IN" smtClean="0"/>
+              <a:pPr/>
               <a:t>22-06-2013</a:t>
             </a:fld>
             <a:endParaRPr lang="en-IN"/>
@@ -330,6 +332,7 @@
           <a:p>
             <a:fld id="{F26ED986-EE84-45CF-8B31-32DA34687EE6}" type="slidenum">
               <a:rPr lang="en-IN" smtClean="0"/>
+              <a:pPr/>
               <a:t>‹#›</a:t>
             </a:fld>
             <a:endParaRPr lang="en-IN"/>
@@ -453,6 +456,7 @@
           <a:p>
             <a:fld id="{8623F981-5450-4885-8B10-CA221A48D640}" type="datetimeFigureOut">
               <a:rPr lang="en-IN" smtClean="0"/>
+              <a:pPr/>
               <a:t>22-06-2013</a:t>
             </a:fld>
             <a:endParaRPr lang="en-IN"/>
@@ -495,6 +499,7 @@
           <a:p>
             <a:fld id="{F26ED986-EE84-45CF-8B31-32DA34687EE6}" type="slidenum">
               <a:rPr lang="en-IN" smtClean="0"/>
+              <a:pPr/>
               <a:t>‹#›</a:t>
             </a:fld>
             <a:endParaRPr lang="en-IN"/>
@@ -628,6 +633,7 @@
           <a:p>
             <a:fld id="{8623F981-5450-4885-8B10-CA221A48D640}" type="datetimeFigureOut">
               <a:rPr lang="en-IN" smtClean="0"/>
+              <a:pPr/>
               <a:t>22-06-2013</a:t>
             </a:fld>
             <a:endParaRPr lang="en-IN"/>
@@ -670,6 +676,7 @@
           <a:p>
             <a:fld id="{F26ED986-EE84-45CF-8B31-32DA34687EE6}" type="slidenum">
               <a:rPr lang="en-IN" smtClean="0"/>
+              <a:pPr/>
               <a:t>‹#›</a:t>
             </a:fld>
             <a:endParaRPr lang="en-IN"/>
@@ -793,6 +800,7 @@
           <a:p>
             <a:fld id="{8623F981-5450-4885-8B10-CA221A48D640}" type="datetimeFigureOut">
               <a:rPr lang="en-IN" smtClean="0"/>
+              <a:pPr/>
               <a:t>22-06-2013</a:t>
             </a:fld>
             <a:endParaRPr lang="en-IN"/>
@@ -835,6 +843,7 @@
           <a:p>
             <a:fld id="{F26ED986-EE84-45CF-8B31-32DA34687EE6}" type="slidenum">
               <a:rPr lang="en-IN" smtClean="0"/>
+              <a:pPr/>
               <a:t>‹#›</a:t>
             </a:fld>
             <a:endParaRPr lang="en-IN"/>
@@ -1034,6 +1043,7 @@
           <a:p>
             <a:fld id="{8623F981-5450-4885-8B10-CA221A48D640}" type="datetimeFigureOut">
               <a:rPr lang="en-IN" smtClean="0"/>
+              <a:pPr/>
               <a:t>22-06-2013</a:t>
             </a:fld>
             <a:endParaRPr lang="en-IN"/>
@@ -1076,6 +1086,7 @@
           <a:p>
             <a:fld id="{F26ED986-EE84-45CF-8B31-32DA34687EE6}" type="slidenum">
               <a:rPr lang="en-IN" smtClean="0"/>
+              <a:pPr/>
               <a:t>‹#›</a:t>
             </a:fld>
             <a:endParaRPr lang="en-IN"/>
@@ -1317,6 +1328,7 @@
           <a:p>
             <a:fld id="{8623F981-5450-4885-8B10-CA221A48D640}" type="datetimeFigureOut">
               <a:rPr lang="en-IN" smtClean="0"/>
+              <a:pPr/>
               <a:t>22-06-2013</a:t>
             </a:fld>
             <a:endParaRPr lang="en-IN"/>
@@ -1359,6 +1371,7 @@
           <a:p>
             <a:fld id="{F26ED986-EE84-45CF-8B31-32DA34687EE6}" type="slidenum">
               <a:rPr lang="en-IN" smtClean="0"/>
+              <a:pPr/>
               <a:t>‹#›</a:t>
             </a:fld>
             <a:endParaRPr lang="en-IN"/>
@@ -1734,6 +1747,7 @@
           <a:p>
             <a:fld id="{8623F981-5450-4885-8B10-CA221A48D640}" type="datetimeFigureOut">
               <a:rPr lang="en-IN" smtClean="0"/>
+              <a:pPr/>
               <a:t>22-06-2013</a:t>
             </a:fld>
             <a:endParaRPr lang="en-IN"/>
@@ -1776,6 +1790,7 @@
           <a:p>
             <a:fld id="{F26ED986-EE84-45CF-8B31-32DA34687EE6}" type="slidenum">
               <a:rPr lang="en-IN" smtClean="0"/>
+              <a:pPr/>
               <a:t>‹#›</a:t>
             </a:fld>
             <a:endParaRPr lang="en-IN"/>
@@ -1847,6 +1862,7 @@
           <a:p>
             <a:fld id="{8623F981-5450-4885-8B10-CA221A48D640}" type="datetimeFigureOut">
               <a:rPr lang="en-IN" smtClean="0"/>
+              <a:pPr/>
               <a:t>22-06-2013</a:t>
             </a:fld>
             <a:endParaRPr lang="en-IN"/>
@@ -1889,6 +1905,7 @@
           <a:p>
             <a:fld id="{F26ED986-EE84-45CF-8B31-32DA34687EE6}" type="slidenum">
               <a:rPr lang="en-IN" smtClean="0"/>
+              <a:pPr/>
               <a:t>‹#›</a:t>
             </a:fld>
             <a:endParaRPr lang="en-IN"/>
@@ -1937,6 +1954,7 @@
           <a:p>
             <a:fld id="{8623F981-5450-4885-8B10-CA221A48D640}" type="datetimeFigureOut">
               <a:rPr lang="en-IN" smtClean="0"/>
+              <a:pPr/>
               <a:t>22-06-2013</a:t>
             </a:fld>
             <a:endParaRPr lang="en-IN"/>
@@ -1979,6 +1997,7 @@
           <a:p>
             <a:fld id="{F26ED986-EE84-45CF-8B31-32DA34687EE6}" type="slidenum">
               <a:rPr lang="en-IN" smtClean="0"/>
+              <a:pPr/>
               <a:t>‹#›</a:t>
             </a:fld>
             <a:endParaRPr lang="en-IN"/>
@@ -2209,6 +2228,7 @@
           <a:p>
             <a:fld id="{8623F981-5450-4885-8B10-CA221A48D640}" type="datetimeFigureOut">
               <a:rPr lang="en-IN" smtClean="0"/>
+              <a:pPr/>
               <a:t>22-06-2013</a:t>
             </a:fld>
             <a:endParaRPr lang="en-IN"/>
@@ -2251,6 +2271,7 @@
           <a:p>
             <a:fld id="{F26ED986-EE84-45CF-8B31-32DA34687EE6}" type="slidenum">
               <a:rPr lang="en-IN" smtClean="0"/>
+              <a:pPr/>
               <a:t>‹#›</a:t>
             </a:fld>
             <a:endParaRPr lang="en-IN"/>
@@ -2457,6 +2478,7 @@
           <a:p>
             <a:fld id="{8623F981-5450-4885-8B10-CA221A48D640}" type="datetimeFigureOut">
               <a:rPr lang="en-IN" smtClean="0"/>
+              <a:pPr/>
               <a:t>22-06-2013</a:t>
             </a:fld>
             <a:endParaRPr lang="en-IN"/>
@@ -2499,6 +2521,7 @@
           <a:p>
             <a:fld id="{F26ED986-EE84-45CF-8B31-32DA34687EE6}" type="slidenum">
               <a:rPr lang="en-IN" smtClean="0"/>
+              <a:pPr/>
               <a:t>‹#›</a:t>
             </a:fld>
             <a:endParaRPr lang="en-IN"/>
@@ -2665,6 +2688,7 @@
           <a:p>
             <a:fld id="{8623F981-5450-4885-8B10-CA221A48D640}" type="datetimeFigureOut">
               <a:rPr lang="en-IN" smtClean="0"/>
+              <a:pPr/>
               <a:t>22-06-2013</a:t>
             </a:fld>
             <a:endParaRPr lang="en-IN"/>
@@ -2743,6 +2767,7 @@
           <a:p>
             <a:fld id="{F26ED986-EE84-45CF-8B31-32DA34687EE6}" type="slidenum">
               <a:rPr lang="en-IN" smtClean="0"/>
+              <a:pPr/>
               <a:t>‹#›</a:t>
             </a:fld>
             <a:endParaRPr lang="en-IN"/>
@@ -4596,6 +4621,1664 @@
               <a:rPr lang="en-US" dirty="0" smtClean="0"/>
               <a:t>File system details</a:t>
             </a:r>
+            <a:endParaRPr lang="en-IN" dirty="0"/>
+          </a:p>
+        </p:txBody>
+      </p:sp>
+    </p:spTree>
+  </p:cSld>
+  <p:clrMapOvr>
+    <a:masterClrMapping/>
+  </p:clrMapOvr>
+</p:sld>
+</file>
+
+<file path=ppt/slides/slide2.xml><?xml version="1.0" encoding="utf-8"?>
+<p:sld xmlns:a="http://schemas.openxmlformats.org/drawingml/2006/main" xmlns:r="http://schemas.openxmlformats.org/officeDocument/2006/relationships" xmlns:p="http://schemas.openxmlformats.org/presentationml/2006/main">
+  <p:cSld>
+    <p:spTree>
+      <p:nvGrpSpPr>
+        <p:cNvPr id="1" name=""/>
+        <p:cNvGrpSpPr/>
+        <p:nvPr/>
+      </p:nvGrpSpPr>
+      <p:grpSpPr>
+        <a:xfrm>
+          <a:off x="0" y="0"/>
+          <a:ext cx="0" cy="0"/>
+          <a:chOff x="0" y="0"/>
+          <a:chExt cx="0" cy="0"/>
+        </a:xfrm>
+      </p:grpSpPr>
+      <p:sp>
+        <p:nvSpPr>
+          <p:cNvPr id="67" name="Oval 66"/>
+          <p:cNvSpPr/>
+          <p:nvPr/>
+        </p:nvSpPr>
+        <p:spPr>
+          <a:xfrm>
+            <a:off x="3563888" y="2852936"/>
+            <a:ext cx="2088232" cy="1296144"/>
+          </a:xfrm>
+          <a:prstGeom prst="ellipse">
+            <a:avLst/>
+          </a:prstGeom>
+          <a:noFill/>
+          <a:ln>
+            <a:solidFill>
+              <a:schemeClr val="tx1"/>
+            </a:solidFill>
+          </a:ln>
+        </p:spPr>
+        <p:style>
+          <a:lnRef idx="2">
+            <a:schemeClr val="accent1">
+              <a:shade val="50000"/>
+            </a:schemeClr>
+          </a:lnRef>
+          <a:fillRef idx="1">
+            <a:schemeClr val="accent1"/>
+          </a:fillRef>
+          <a:effectRef idx="0">
+            <a:schemeClr val="accent1"/>
+          </a:effectRef>
+          <a:fontRef idx="minor">
+            <a:schemeClr val="lt1"/>
+          </a:fontRef>
+        </p:style>
+        <p:txBody>
+          <a:bodyPr rtlCol="0" anchor="ctr"/>
+          <a:lstStyle/>
+          <a:p>
+            <a:pPr algn="ctr"/>
+            <a:endParaRPr lang="en-IN"/>
+          </a:p>
+        </p:txBody>
+      </p:sp>
+      <p:sp>
+        <p:nvSpPr>
+          <p:cNvPr id="68" name="Rectangle 67"/>
+          <p:cNvSpPr/>
+          <p:nvPr/>
+        </p:nvSpPr>
+        <p:spPr>
+          <a:xfrm>
+            <a:off x="3707904" y="332656"/>
+            <a:ext cx="2088232" cy="1008112"/>
+          </a:xfrm>
+          <a:prstGeom prst="rect">
+            <a:avLst/>
+          </a:prstGeom>
+          <a:noFill/>
+          <a:ln>
+            <a:solidFill>
+              <a:schemeClr val="tx1"/>
+            </a:solidFill>
+          </a:ln>
+        </p:spPr>
+        <p:style>
+          <a:lnRef idx="2">
+            <a:schemeClr val="accent1">
+              <a:shade val="50000"/>
+            </a:schemeClr>
+          </a:lnRef>
+          <a:fillRef idx="1">
+            <a:schemeClr val="accent1"/>
+          </a:fillRef>
+          <a:effectRef idx="0">
+            <a:schemeClr val="accent1"/>
+          </a:effectRef>
+          <a:fontRef idx="minor">
+            <a:schemeClr val="lt1"/>
+          </a:fontRef>
+        </p:style>
+        <p:txBody>
+          <a:bodyPr rtlCol="0" anchor="ctr"/>
+          <a:lstStyle/>
+          <a:p>
+            <a:pPr algn="ctr"/>
+            <a:endParaRPr lang="en-IN"/>
+          </a:p>
+        </p:txBody>
+      </p:sp>
+      <p:sp>
+        <p:nvSpPr>
+          <p:cNvPr id="74" name="TextBox 73"/>
+          <p:cNvSpPr txBox="1"/>
+          <p:nvPr/>
+        </p:nvSpPr>
+        <p:spPr>
+          <a:xfrm>
+            <a:off x="3923928" y="2996952"/>
+            <a:ext cx="1443793" cy="923330"/>
+          </a:xfrm>
+          <a:prstGeom prst="rect">
+            <a:avLst/>
+          </a:prstGeom>
+          <a:noFill/>
+        </p:spPr>
+        <p:txBody>
+          <a:bodyPr wrap="none" rtlCol="0">
+            <a:spAutoFit/>
+          </a:bodyPr>
+          <a:lstStyle/>
+          <a:p>
+            <a:pPr algn="ctr"/>
+            <a:r>
+              <a:rPr lang="en-US" dirty="0" smtClean="0"/>
+              <a:t>File </a:t>
+            </a:r>
+          </a:p>
+          <a:p>
+            <a:pPr algn="ctr"/>
+            <a:r>
+              <a:rPr lang="en-US" dirty="0" smtClean="0"/>
+              <a:t>Management</a:t>
+            </a:r>
+          </a:p>
+          <a:p>
+            <a:pPr algn="ctr"/>
+            <a:r>
+              <a:rPr lang="en-US" dirty="0" smtClean="0"/>
+              <a:t>System</a:t>
+            </a:r>
+            <a:endParaRPr lang="en-IN" dirty="0"/>
+          </a:p>
+        </p:txBody>
+      </p:sp>
+      <p:sp>
+        <p:nvSpPr>
+          <p:cNvPr id="75" name="TextBox 74"/>
+          <p:cNvSpPr txBox="1"/>
+          <p:nvPr/>
+        </p:nvSpPr>
+        <p:spPr>
+          <a:xfrm>
+            <a:off x="4067944" y="620688"/>
+            <a:ext cx="1440907" cy="369332"/>
+          </a:xfrm>
+          <a:prstGeom prst="rect">
+            <a:avLst/>
+          </a:prstGeom>
+          <a:noFill/>
+        </p:spPr>
+        <p:txBody>
+          <a:bodyPr wrap="none" rtlCol="0">
+            <a:spAutoFit/>
+          </a:bodyPr>
+          <a:lstStyle/>
+          <a:p>
+            <a:r>
+              <a:rPr lang="en-US" dirty="0" smtClean="0"/>
+              <a:t>Mobile Client</a:t>
+            </a:r>
+            <a:endParaRPr lang="en-IN" dirty="0"/>
+          </a:p>
+        </p:txBody>
+      </p:sp>
+      <p:sp>
+        <p:nvSpPr>
+          <p:cNvPr id="76" name="TextBox 75"/>
+          <p:cNvSpPr txBox="1"/>
+          <p:nvPr/>
+        </p:nvSpPr>
+        <p:spPr>
+          <a:xfrm>
+            <a:off x="7164288" y="1052736"/>
+            <a:ext cx="1126206" cy="1200329"/>
+          </a:xfrm>
+          <a:prstGeom prst="rect">
+            <a:avLst/>
+          </a:prstGeom>
+          <a:noFill/>
+        </p:spPr>
+        <p:txBody>
+          <a:bodyPr wrap="none" rtlCol="0">
+            <a:spAutoFit/>
+          </a:bodyPr>
+          <a:lstStyle/>
+          <a:p>
+            <a:pPr algn="ctr"/>
+            <a:r>
+              <a:rPr lang="en-US" dirty="0" smtClean="0"/>
+              <a:t>Web </a:t>
+            </a:r>
+            <a:endParaRPr lang="en-US" dirty="0" smtClean="0"/>
+          </a:p>
+          <a:p>
+            <a:pPr algn="ctr"/>
+            <a:r>
+              <a:rPr lang="en-US" dirty="0" smtClean="0"/>
+              <a:t>Client</a:t>
+            </a:r>
+          </a:p>
+          <a:p>
+            <a:pPr algn="ctr"/>
+            <a:r>
+              <a:rPr lang="en-IN" dirty="0" smtClean="0"/>
+              <a:t>Controller</a:t>
+            </a:r>
+          </a:p>
+          <a:p>
+            <a:endParaRPr lang="en-IN" dirty="0"/>
+          </a:p>
+        </p:txBody>
+      </p:sp>
+      <p:sp>
+        <p:nvSpPr>
+          <p:cNvPr id="77" name="TextBox 76"/>
+          <p:cNvSpPr txBox="1"/>
+          <p:nvPr/>
+        </p:nvSpPr>
+        <p:spPr>
+          <a:xfrm>
+            <a:off x="6921815" y="4365104"/>
+            <a:ext cx="1126206" cy="923330"/>
+          </a:xfrm>
+          <a:prstGeom prst="rect">
+            <a:avLst/>
+          </a:prstGeom>
+          <a:noFill/>
+        </p:spPr>
+        <p:txBody>
+          <a:bodyPr wrap="none" rtlCol="0">
+            <a:spAutoFit/>
+          </a:bodyPr>
+          <a:lstStyle/>
+          <a:p>
+            <a:pPr algn="ctr"/>
+            <a:r>
+              <a:rPr lang="en-IN" dirty="0" smtClean="0"/>
+              <a:t>Desktop </a:t>
+            </a:r>
+            <a:endParaRPr lang="en-IN" dirty="0" smtClean="0"/>
+          </a:p>
+          <a:p>
+            <a:pPr algn="ctr"/>
+            <a:r>
+              <a:rPr lang="en-IN" dirty="0" smtClean="0"/>
+              <a:t>Client </a:t>
+            </a:r>
+          </a:p>
+          <a:p>
+            <a:pPr algn="ctr"/>
+            <a:r>
+              <a:rPr lang="en-IN" dirty="0" smtClean="0"/>
+              <a:t>Controller</a:t>
+            </a:r>
+            <a:endParaRPr lang="en-IN" dirty="0"/>
+          </a:p>
+        </p:txBody>
+      </p:sp>
+      <p:sp>
+        <p:nvSpPr>
+          <p:cNvPr id="78" name="TextBox 77"/>
+          <p:cNvSpPr txBox="1"/>
+          <p:nvPr/>
+        </p:nvSpPr>
+        <p:spPr>
+          <a:xfrm>
+            <a:off x="4064311" y="5661248"/>
+            <a:ext cx="1443793" cy="646331"/>
+          </a:xfrm>
+          <a:prstGeom prst="rect">
+            <a:avLst/>
+          </a:prstGeom>
+          <a:noFill/>
+        </p:spPr>
+        <p:txBody>
+          <a:bodyPr wrap="none" rtlCol="0">
+            <a:spAutoFit/>
+          </a:bodyPr>
+          <a:lstStyle/>
+          <a:p>
+            <a:pPr algn="ctr"/>
+            <a:r>
+              <a:rPr lang="en-US" dirty="0" smtClean="0"/>
+              <a:t>Admin</a:t>
+            </a:r>
+          </a:p>
+          <a:p>
+            <a:pPr algn="ctr"/>
+            <a:r>
+              <a:rPr lang="en-US" dirty="0" smtClean="0"/>
+              <a:t>Management</a:t>
+            </a:r>
+            <a:endParaRPr lang="en-IN" dirty="0"/>
+          </a:p>
+        </p:txBody>
+      </p:sp>
+      <p:sp>
+        <p:nvSpPr>
+          <p:cNvPr id="79" name="TextBox 78"/>
+          <p:cNvSpPr txBox="1"/>
+          <p:nvPr/>
+        </p:nvSpPr>
+        <p:spPr>
+          <a:xfrm>
+            <a:off x="607927" y="4870901"/>
+            <a:ext cx="1443793" cy="646331"/>
+          </a:xfrm>
+          <a:prstGeom prst="rect">
+            <a:avLst/>
+          </a:prstGeom>
+          <a:noFill/>
+        </p:spPr>
+        <p:txBody>
+          <a:bodyPr wrap="none" rtlCol="0">
+            <a:spAutoFit/>
+          </a:bodyPr>
+          <a:lstStyle/>
+          <a:p>
+            <a:pPr algn="ctr"/>
+            <a:r>
+              <a:rPr lang="en-US" dirty="0" smtClean="0"/>
+              <a:t>User</a:t>
+            </a:r>
+          </a:p>
+          <a:p>
+            <a:pPr algn="ctr"/>
+            <a:r>
+              <a:rPr lang="en-US" dirty="0" smtClean="0"/>
+              <a:t>Management</a:t>
+            </a:r>
+            <a:endParaRPr lang="en-IN" dirty="0"/>
+          </a:p>
+        </p:txBody>
+      </p:sp>
+      <p:sp>
+        <p:nvSpPr>
+          <p:cNvPr id="80" name="TextBox 79"/>
+          <p:cNvSpPr txBox="1"/>
+          <p:nvPr/>
+        </p:nvSpPr>
+        <p:spPr>
+          <a:xfrm>
+            <a:off x="683568" y="1484784"/>
+            <a:ext cx="1443793" cy="1200329"/>
+          </a:xfrm>
+          <a:prstGeom prst="rect">
+            <a:avLst/>
+          </a:prstGeom>
+          <a:noFill/>
+        </p:spPr>
+        <p:txBody>
+          <a:bodyPr wrap="none" rtlCol="0">
+            <a:spAutoFit/>
+          </a:bodyPr>
+          <a:lstStyle/>
+          <a:p>
+            <a:pPr algn="ctr"/>
+            <a:r>
+              <a:rPr lang="en-US" dirty="0" smtClean="0"/>
+              <a:t>External</a:t>
+            </a:r>
+          </a:p>
+          <a:p>
+            <a:pPr algn="ctr"/>
+            <a:r>
+              <a:rPr lang="en-US" dirty="0" smtClean="0"/>
+              <a:t>Device</a:t>
+            </a:r>
+          </a:p>
+          <a:p>
+            <a:pPr algn="ctr"/>
+            <a:r>
+              <a:rPr lang="en-US" dirty="0" smtClean="0"/>
+              <a:t>Management</a:t>
+            </a:r>
+            <a:endParaRPr lang="en-US" dirty="0" smtClean="0"/>
+          </a:p>
+          <a:p>
+            <a:r>
+              <a:rPr lang="en-US" dirty="0" smtClean="0"/>
+              <a:t> </a:t>
+            </a:r>
+            <a:endParaRPr lang="en-IN" dirty="0"/>
+          </a:p>
+        </p:txBody>
+      </p:sp>
+      <p:cxnSp>
+        <p:nvCxnSpPr>
+          <p:cNvPr id="92" name="Straight Arrow Connector 91"/>
+          <p:cNvCxnSpPr/>
+          <p:nvPr/>
+        </p:nvCxnSpPr>
+        <p:spPr>
+          <a:xfrm flipH="1">
+            <a:off x="5292080" y="2996952"/>
+            <a:ext cx="648072" cy="0"/>
+          </a:xfrm>
+          <a:prstGeom prst="straightConnector1">
+            <a:avLst/>
+          </a:prstGeom>
+          <a:ln>
+            <a:solidFill>
+              <a:schemeClr val="tx1"/>
+            </a:solidFill>
+            <a:tailEnd type="arrow"/>
+          </a:ln>
+        </p:spPr>
+        <p:style>
+          <a:lnRef idx="1">
+            <a:schemeClr val="accent1"/>
+          </a:lnRef>
+          <a:fillRef idx="0">
+            <a:schemeClr val="accent1"/>
+          </a:fillRef>
+          <a:effectRef idx="0">
+            <a:schemeClr val="accent1"/>
+          </a:effectRef>
+          <a:fontRef idx="minor">
+            <a:schemeClr val="tx1"/>
+          </a:fontRef>
+        </p:style>
+      </p:cxnSp>
+      <p:cxnSp>
+        <p:nvCxnSpPr>
+          <p:cNvPr id="95" name="Straight Connector 94"/>
+          <p:cNvCxnSpPr/>
+          <p:nvPr/>
+        </p:nvCxnSpPr>
+        <p:spPr>
+          <a:xfrm flipV="1">
+            <a:off x="5940152" y="836712"/>
+            <a:ext cx="0" cy="2160240"/>
+          </a:xfrm>
+          <a:prstGeom prst="line">
+            <a:avLst/>
+          </a:prstGeom>
+          <a:ln>
+            <a:solidFill>
+              <a:schemeClr val="tx1"/>
+            </a:solidFill>
+          </a:ln>
+        </p:spPr>
+        <p:style>
+          <a:lnRef idx="1">
+            <a:schemeClr val="accent1"/>
+          </a:lnRef>
+          <a:fillRef idx="0">
+            <a:schemeClr val="accent1"/>
+          </a:fillRef>
+          <a:effectRef idx="0">
+            <a:schemeClr val="accent1"/>
+          </a:effectRef>
+          <a:fontRef idx="minor">
+            <a:schemeClr val="tx1"/>
+          </a:fontRef>
+        </p:style>
+      </p:cxnSp>
+      <p:cxnSp>
+        <p:nvCxnSpPr>
+          <p:cNvPr id="99" name="Straight Connector 98"/>
+          <p:cNvCxnSpPr>
+            <a:stCxn id="68" idx="3"/>
+          </p:cNvCxnSpPr>
+          <p:nvPr/>
+        </p:nvCxnSpPr>
+        <p:spPr>
+          <a:xfrm>
+            <a:off x="5796136" y="836712"/>
+            <a:ext cx="144016" cy="0"/>
+          </a:xfrm>
+          <a:prstGeom prst="line">
+            <a:avLst/>
+          </a:prstGeom>
+          <a:ln>
+            <a:solidFill>
+              <a:schemeClr val="tx1"/>
+            </a:solidFill>
+          </a:ln>
+        </p:spPr>
+        <p:style>
+          <a:lnRef idx="1">
+            <a:schemeClr val="accent1"/>
+          </a:lnRef>
+          <a:fillRef idx="0">
+            <a:schemeClr val="accent1"/>
+          </a:fillRef>
+          <a:effectRef idx="0">
+            <a:schemeClr val="accent1"/>
+          </a:effectRef>
+          <a:fontRef idx="minor">
+            <a:schemeClr val="tx1"/>
+          </a:fontRef>
+        </p:style>
+      </p:cxnSp>
+      <p:cxnSp>
+        <p:nvCxnSpPr>
+          <p:cNvPr id="102" name="Straight Arrow Connector 101"/>
+          <p:cNvCxnSpPr>
+            <a:endCxn id="68" idx="1"/>
+          </p:cNvCxnSpPr>
+          <p:nvPr/>
+        </p:nvCxnSpPr>
+        <p:spPr>
+          <a:xfrm>
+            <a:off x="3419872" y="836712"/>
+            <a:ext cx="288032" cy="0"/>
+          </a:xfrm>
+          <a:prstGeom prst="straightConnector1">
+            <a:avLst/>
+          </a:prstGeom>
+          <a:ln>
+            <a:solidFill>
+              <a:schemeClr val="tx1"/>
+            </a:solidFill>
+            <a:tailEnd type="arrow"/>
+          </a:ln>
+        </p:spPr>
+        <p:style>
+          <a:lnRef idx="1">
+            <a:schemeClr val="accent1"/>
+          </a:lnRef>
+          <a:fillRef idx="0">
+            <a:schemeClr val="accent1"/>
+          </a:fillRef>
+          <a:effectRef idx="0">
+            <a:schemeClr val="accent1"/>
+          </a:effectRef>
+          <a:fontRef idx="minor">
+            <a:schemeClr val="tx1"/>
+          </a:fontRef>
+        </p:style>
+      </p:cxnSp>
+      <p:cxnSp>
+        <p:nvCxnSpPr>
+          <p:cNvPr id="105" name="Straight Connector 104"/>
+          <p:cNvCxnSpPr/>
+          <p:nvPr/>
+        </p:nvCxnSpPr>
+        <p:spPr>
+          <a:xfrm>
+            <a:off x="3419872" y="836712"/>
+            <a:ext cx="0" cy="2088232"/>
+          </a:xfrm>
+          <a:prstGeom prst="line">
+            <a:avLst/>
+          </a:prstGeom>
+          <a:ln>
+            <a:solidFill>
+              <a:schemeClr val="tx1"/>
+            </a:solidFill>
+          </a:ln>
+        </p:spPr>
+        <p:style>
+          <a:lnRef idx="1">
+            <a:schemeClr val="accent1"/>
+          </a:lnRef>
+          <a:fillRef idx="0">
+            <a:schemeClr val="accent1"/>
+          </a:fillRef>
+          <a:effectRef idx="0">
+            <a:schemeClr val="accent1"/>
+          </a:effectRef>
+          <a:fontRef idx="minor">
+            <a:schemeClr val="tx1"/>
+          </a:fontRef>
+        </p:style>
+      </p:cxnSp>
+      <p:cxnSp>
+        <p:nvCxnSpPr>
+          <p:cNvPr id="107" name="Straight Connector 106"/>
+          <p:cNvCxnSpPr/>
+          <p:nvPr/>
+        </p:nvCxnSpPr>
+        <p:spPr>
+          <a:xfrm>
+            <a:off x="3419872" y="2924944"/>
+            <a:ext cx="648072" cy="0"/>
+          </a:xfrm>
+          <a:prstGeom prst="line">
+            <a:avLst/>
+          </a:prstGeom>
+          <a:ln>
+            <a:solidFill>
+              <a:schemeClr val="tx1"/>
+            </a:solidFill>
+          </a:ln>
+        </p:spPr>
+        <p:style>
+          <a:lnRef idx="1">
+            <a:schemeClr val="accent1"/>
+          </a:lnRef>
+          <a:fillRef idx="0">
+            <a:schemeClr val="accent1"/>
+          </a:fillRef>
+          <a:effectRef idx="0">
+            <a:schemeClr val="accent1"/>
+          </a:effectRef>
+          <a:fontRef idx="minor">
+            <a:schemeClr val="tx1"/>
+          </a:fontRef>
+        </p:style>
+      </p:cxnSp>
+      <p:cxnSp>
+        <p:nvCxnSpPr>
+          <p:cNvPr id="111" name="Straight Arrow Connector 110"/>
+          <p:cNvCxnSpPr/>
+          <p:nvPr/>
+        </p:nvCxnSpPr>
+        <p:spPr>
+          <a:xfrm>
+            <a:off x="4139952" y="4077072"/>
+            <a:ext cx="0" cy="1440160"/>
+          </a:xfrm>
+          <a:prstGeom prst="straightConnector1">
+            <a:avLst/>
+          </a:prstGeom>
+          <a:ln>
+            <a:solidFill>
+              <a:schemeClr val="tx1"/>
+            </a:solidFill>
+            <a:tailEnd type="arrow"/>
+          </a:ln>
+        </p:spPr>
+        <p:style>
+          <a:lnRef idx="1">
+            <a:schemeClr val="accent1"/>
+          </a:lnRef>
+          <a:fillRef idx="0">
+            <a:schemeClr val="accent1"/>
+          </a:fillRef>
+          <a:effectRef idx="0">
+            <a:schemeClr val="accent1"/>
+          </a:effectRef>
+          <a:fontRef idx="minor">
+            <a:schemeClr val="tx1"/>
+          </a:fontRef>
+        </p:style>
+      </p:cxnSp>
+      <p:cxnSp>
+        <p:nvCxnSpPr>
+          <p:cNvPr id="116" name="Straight Arrow Connector 115"/>
+          <p:cNvCxnSpPr/>
+          <p:nvPr/>
+        </p:nvCxnSpPr>
+        <p:spPr>
+          <a:xfrm flipV="1">
+            <a:off x="5220072" y="4005064"/>
+            <a:ext cx="1" cy="1512168"/>
+          </a:xfrm>
+          <a:prstGeom prst="straightConnector1">
+            <a:avLst/>
+          </a:prstGeom>
+          <a:ln>
+            <a:solidFill>
+              <a:schemeClr val="tx1"/>
+            </a:solidFill>
+            <a:tailEnd type="arrow"/>
+          </a:ln>
+        </p:spPr>
+        <p:style>
+          <a:lnRef idx="1">
+            <a:schemeClr val="accent1"/>
+          </a:lnRef>
+          <a:fillRef idx="0">
+            <a:schemeClr val="accent1"/>
+          </a:fillRef>
+          <a:effectRef idx="0">
+            <a:schemeClr val="accent1"/>
+          </a:effectRef>
+          <a:fontRef idx="minor">
+            <a:schemeClr val="tx1"/>
+          </a:fontRef>
+        </p:style>
+      </p:cxnSp>
+      <p:cxnSp>
+        <p:nvCxnSpPr>
+          <p:cNvPr id="119" name="Shape 118"/>
+          <p:cNvCxnSpPr/>
+          <p:nvPr/>
+        </p:nvCxnSpPr>
+        <p:spPr>
+          <a:xfrm>
+            <a:off x="5508104" y="3789042"/>
+            <a:ext cx="1080122" cy="648072"/>
+          </a:xfrm>
+          <a:prstGeom prst="bentConnector3">
+            <a:avLst>
+              <a:gd name="adj1" fmla="val 525"/>
+            </a:avLst>
+          </a:prstGeom>
+          <a:ln>
+            <a:solidFill>
+              <a:schemeClr val="tx1"/>
+            </a:solidFill>
+            <a:tailEnd type="arrow"/>
+          </a:ln>
+        </p:spPr>
+        <p:style>
+          <a:lnRef idx="1">
+            <a:schemeClr val="accent1"/>
+          </a:lnRef>
+          <a:fillRef idx="0">
+            <a:schemeClr val="accent1"/>
+          </a:fillRef>
+          <a:effectRef idx="0">
+            <a:schemeClr val="accent1"/>
+          </a:effectRef>
+          <a:fontRef idx="minor">
+            <a:schemeClr val="tx1"/>
+          </a:fontRef>
+        </p:style>
+      </p:cxnSp>
+      <p:cxnSp>
+        <p:nvCxnSpPr>
+          <p:cNvPr id="123" name="Elbow Connector 122"/>
+          <p:cNvCxnSpPr>
+            <a:endCxn id="67" idx="6"/>
+          </p:cNvCxnSpPr>
+          <p:nvPr/>
+        </p:nvCxnSpPr>
+        <p:spPr>
+          <a:xfrm rot="10800000">
+            <a:off x="5652120" y="3501008"/>
+            <a:ext cx="1800200" cy="576064"/>
+          </a:xfrm>
+          <a:prstGeom prst="bentConnector3">
+            <a:avLst>
+              <a:gd name="adj1" fmla="val -794"/>
+            </a:avLst>
+          </a:prstGeom>
+          <a:ln>
+            <a:solidFill>
+              <a:schemeClr val="tx1"/>
+            </a:solidFill>
+            <a:tailEnd type="arrow"/>
+          </a:ln>
+        </p:spPr>
+        <p:style>
+          <a:lnRef idx="1">
+            <a:schemeClr val="accent1"/>
+          </a:lnRef>
+          <a:fillRef idx="0">
+            <a:schemeClr val="accent1"/>
+          </a:fillRef>
+          <a:effectRef idx="0">
+            <a:schemeClr val="accent1"/>
+          </a:effectRef>
+          <a:fontRef idx="minor">
+            <a:schemeClr val="tx1"/>
+          </a:fontRef>
+        </p:style>
+      </p:cxnSp>
+      <p:cxnSp>
+        <p:nvCxnSpPr>
+          <p:cNvPr id="128" name="Shape 127"/>
+          <p:cNvCxnSpPr/>
+          <p:nvPr/>
+        </p:nvCxnSpPr>
+        <p:spPr>
+          <a:xfrm flipV="1">
+            <a:off x="5652120" y="2276872"/>
+            <a:ext cx="1980220" cy="1080120"/>
+          </a:xfrm>
+          <a:prstGeom prst="bentConnector2">
+            <a:avLst/>
+          </a:prstGeom>
+          <a:ln>
+            <a:solidFill>
+              <a:schemeClr val="tx1"/>
+            </a:solidFill>
+            <a:tailEnd type="arrow"/>
+          </a:ln>
+        </p:spPr>
+        <p:style>
+          <a:lnRef idx="1">
+            <a:schemeClr val="accent1"/>
+          </a:lnRef>
+          <a:fillRef idx="0">
+            <a:schemeClr val="accent1"/>
+          </a:fillRef>
+          <a:effectRef idx="0">
+            <a:schemeClr val="accent1"/>
+          </a:effectRef>
+          <a:fontRef idx="minor">
+            <a:schemeClr val="tx1"/>
+          </a:fontRef>
+        </p:style>
+      </p:cxnSp>
+      <p:cxnSp>
+        <p:nvCxnSpPr>
+          <p:cNvPr id="130" name="Shape 129"/>
+          <p:cNvCxnSpPr/>
+          <p:nvPr/>
+        </p:nvCxnSpPr>
+        <p:spPr>
+          <a:xfrm rot="10800000" flipV="1">
+            <a:off x="5508104" y="2276872"/>
+            <a:ext cx="1296144" cy="864096"/>
+          </a:xfrm>
+          <a:prstGeom prst="bentConnector3">
+            <a:avLst>
+              <a:gd name="adj1" fmla="val 1441"/>
+            </a:avLst>
+          </a:prstGeom>
+          <a:ln>
+            <a:solidFill>
+              <a:schemeClr val="tx1"/>
+            </a:solidFill>
+            <a:tailEnd type="arrow"/>
+          </a:ln>
+        </p:spPr>
+        <p:style>
+          <a:lnRef idx="1">
+            <a:schemeClr val="accent1"/>
+          </a:lnRef>
+          <a:fillRef idx="0">
+            <a:schemeClr val="accent1"/>
+          </a:fillRef>
+          <a:effectRef idx="0">
+            <a:schemeClr val="accent1"/>
+          </a:effectRef>
+          <a:fontRef idx="minor">
+            <a:schemeClr val="tx1"/>
+          </a:fontRef>
+        </p:style>
+      </p:cxnSp>
+      <p:cxnSp>
+        <p:nvCxnSpPr>
+          <p:cNvPr id="136" name="Shape 135"/>
+          <p:cNvCxnSpPr/>
+          <p:nvPr/>
+        </p:nvCxnSpPr>
+        <p:spPr>
+          <a:xfrm flipV="1">
+            <a:off x="2555776" y="3789040"/>
+            <a:ext cx="1116124" cy="1080120"/>
+          </a:xfrm>
+          <a:prstGeom prst="bentConnector3">
+            <a:avLst>
+              <a:gd name="adj1" fmla="val 100007"/>
+            </a:avLst>
+          </a:prstGeom>
+          <a:ln>
+            <a:solidFill>
+              <a:schemeClr val="tx1"/>
+            </a:solidFill>
+            <a:tailEnd type="arrow"/>
+          </a:ln>
+        </p:spPr>
+        <p:style>
+          <a:lnRef idx="1">
+            <a:schemeClr val="accent1"/>
+          </a:lnRef>
+          <a:fillRef idx="0">
+            <a:schemeClr val="accent1"/>
+          </a:fillRef>
+          <a:effectRef idx="0">
+            <a:schemeClr val="accent1"/>
+          </a:effectRef>
+          <a:fontRef idx="minor">
+            <a:schemeClr val="tx1"/>
+          </a:fontRef>
+        </p:style>
+      </p:cxnSp>
+      <p:cxnSp>
+        <p:nvCxnSpPr>
+          <p:cNvPr id="143" name="Shape 129"/>
+          <p:cNvCxnSpPr>
+            <a:stCxn id="67" idx="2"/>
+          </p:cNvCxnSpPr>
+          <p:nvPr/>
+        </p:nvCxnSpPr>
+        <p:spPr>
+          <a:xfrm rot="10800000" flipV="1">
+            <a:off x="1331640" y="3501008"/>
+            <a:ext cx="2232248" cy="864096"/>
+          </a:xfrm>
+          <a:prstGeom prst="bentConnector3">
+            <a:avLst>
+              <a:gd name="adj1" fmla="val 100007"/>
+            </a:avLst>
+          </a:prstGeom>
+          <a:ln>
+            <a:solidFill>
+              <a:schemeClr val="tx1"/>
+            </a:solidFill>
+            <a:tailEnd type="arrow"/>
+          </a:ln>
+        </p:spPr>
+        <p:style>
+          <a:lnRef idx="1">
+            <a:schemeClr val="accent1"/>
+          </a:lnRef>
+          <a:fillRef idx="0">
+            <a:schemeClr val="accent1"/>
+          </a:fillRef>
+          <a:effectRef idx="0">
+            <a:schemeClr val="accent1"/>
+          </a:effectRef>
+          <a:fontRef idx="minor">
+            <a:schemeClr val="tx1"/>
+          </a:fontRef>
+        </p:style>
+      </p:cxnSp>
+      <p:cxnSp>
+        <p:nvCxnSpPr>
+          <p:cNvPr id="149" name="Shape 129"/>
+          <p:cNvCxnSpPr/>
+          <p:nvPr/>
+        </p:nvCxnSpPr>
+        <p:spPr>
+          <a:xfrm>
+            <a:off x="1475656" y="2564904"/>
+            <a:ext cx="2232248" cy="576064"/>
+          </a:xfrm>
+          <a:prstGeom prst="bentConnector3">
+            <a:avLst>
+              <a:gd name="adj1" fmla="val 1057"/>
+            </a:avLst>
+          </a:prstGeom>
+          <a:ln>
+            <a:solidFill>
+              <a:schemeClr val="tx1"/>
+            </a:solidFill>
+            <a:tailEnd type="arrow"/>
+          </a:ln>
+        </p:spPr>
+        <p:style>
+          <a:lnRef idx="1">
+            <a:schemeClr val="accent1"/>
+          </a:lnRef>
+          <a:fillRef idx="0">
+            <a:schemeClr val="accent1"/>
+          </a:fillRef>
+          <a:effectRef idx="0">
+            <a:schemeClr val="accent1"/>
+          </a:effectRef>
+          <a:fontRef idx="minor">
+            <a:schemeClr val="tx1"/>
+          </a:fontRef>
+        </p:style>
+      </p:cxnSp>
+      <p:sp>
+        <p:nvSpPr>
+          <p:cNvPr id="154" name="TextBox 153"/>
+          <p:cNvSpPr txBox="1"/>
+          <p:nvPr/>
+        </p:nvSpPr>
+        <p:spPr>
+          <a:xfrm>
+            <a:off x="4067944" y="4365104"/>
+            <a:ext cx="1073820" cy="923330"/>
+          </a:xfrm>
+          <a:prstGeom prst="rect">
+            <a:avLst/>
+          </a:prstGeom>
+          <a:noFill/>
+        </p:spPr>
+        <p:txBody>
+          <a:bodyPr wrap="none" rtlCol="0">
+            <a:spAutoFit/>
+          </a:bodyPr>
+          <a:lstStyle/>
+          <a:p>
+            <a:r>
+              <a:rPr lang="en-US" dirty="0" smtClean="0"/>
+              <a:t>Ask for </a:t>
+            </a:r>
+          </a:p>
+          <a:p>
+            <a:r>
+              <a:rPr lang="en-US" dirty="0" err="1" smtClean="0"/>
+              <a:t>Authenti</a:t>
+            </a:r>
+            <a:r>
+              <a:rPr lang="en-US" dirty="0" smtClean="0"/>
+              <a:t>-</a:t>
+            </a:r>
+          </a:p>
+          <a:p>
+            <a:r>
+              <a:rPr lang="en-US" dirty="0" err="1" smtClean="0"/>
+              <a:t>cation</a:t>
+            </a:r>
+            <a:r>
+              <a:rPr lang="en-US" dirty="0" smtClean="0"/>
+              <a:t> </a:t>
+            </a:r>
+            <a:endParaRPr lang="en-IN" dirty="0"/>
+          </a:p>
+        </p:txBody>
+      </p:sp>
+      <p:sp>
+        <p:nvSpPr>
+          <p:cNvPr id="155" name="TextBox 154"/>
+          <p:cNvSpPr txBox="1"/>
+          <p:nvPr/>
+        </p:nvSpPr>
+        <p:spPr>
+          <a:xfrm>
+            <a:off x="5169696" y="4869160"/>
+            <a:ext cx="1490536" cy="646331"/>
+          </a:xfrm>
+          <a:prstGeom prst="rect">
+            <a:avLst/>
+          </a:prstGeom>
+          <a:noFill/>
+        </p:spPr>
+        <p:txBody>
+          <a:bodyPr wrap="none" rtlCol="0">
+            <a:spAutoFit/>
+          </a:bodyPr>
+          <a:lstStyle/>
+          <a:p>
+            <a:r>
+              <a:rPr lang="en-US" dirty="0" smtClean="0"/>
+              <a:t>Allow or </a:t>
+            </a:r>
+          </a:p>
+          <a:p>
+            <a:r>
+              <a:rPr lang="en-US" dirty="0" smtClean="0"/>
+              <a:t>reject request</a:t>
+            </a:r>
+            <a:endParaRPr lang="en-IN" dirty="0"/>
+          </a:p>
+        </p:txBody>
+      </p:sp>
+      <p:sp>
+        <p:nvSpPr>
+          <p:cNvPr id="156" name="TextBox 155"/>
+          <p:cNvSpPr txBox="1"/>
+          <p:nvPr/>
+        </p:nvSpPr>
+        <p:spPr>
+          <a:xfrm>
+            <a:off x="5364088" y="4437112"/>
+            <a:ext cx="1286699" cy="369332"/>
+          </a:xfrm>
+          <a:prstGeom prst="rect">
+            <a:avLst/>
+          </a:prstGeom>
+          <a:noFill/>
+        </p:spPr>
+        <p:txBody>
+          <a:bodyPr wrap="none" rtlCol="0">
+            <a:spAutoFit/>
+          </a:bodyPr>
+          <a:lstStyle/>
+          <a:p>
+            <a:r>
+              <a:rPr lang="en-US" dirty="0" smtClean="0"/>
+              <a:t>User details</a:t>
+            </a:r>
+            <a:endParaRPr lang="en-IN" dirty="0"/>
+          </a:p>
+        </p:txBody>
+      </p:sp>
+      <p:sp>
+        <p:nvSpPr>
+          <p:cNvPr id="157" name="TextBox 156"/>
+          <p:cNvSpPr txBox="1"/>
+          <p:nvPr/>
+        </p:nvSpPr>
+        <p:spPr>
+          <a:xfrm>
+            <a:off x="5868144" y="3429000"/>
+            <a:ext cx="1502976" cy="646331"/>
+          </a:xfrm>
+          <a:prstGeom prst="rect">
+            <a:avLst/>
+          </a:prstGeom>
+          <a:noFill/>
+        </p:spPr>
+        <p:txBody>
+          <a:bodyPr wrap="none" rtlCol="0">
+            <a:spAutoFit/>
+          </a:bodyPr>
+          <a:lstStyle/>
+          <a:p>
+            <a:r>
+              <a:rPr lang="en-US" dirty="0" smtClean="0"/>
+              <a:t>Provide file </a:t>
+            </a:r>
+          </a:p>
+          <a:p>
+            <a:r>
+              <a:rPr lang="en-US" dirty="0" smtClean="0"/>
+              <a:t>system details</a:t>
+            </a:r>
+            <a:endParaRPr lang="en-IN" dirty="0"/>
+          </a:p>
+        </p:txBody>
+      </p:sp>
+      <p:sp>
+        <p:nvSpPr>
+          <p:cNvPr id="159" name="TextBox 158"/>
+          <p:cNvSpPr txBox="1"/>
+          <p:nvPr/>
+        </p:nvSpPr>
+        <p:spPr>
+          <a:xfrm>
+            <a:off x="7665775" y="2420888"/>
+            <a:ext cx="1478225" cy="646331"/>
+          </a:xfrm>
+          <a:prstGeom prst="rect">
+            <a:avLst/>
+          </a:prstGeom>
+          <a:noFill/>
+        </p:spPr>
+        <p:txBody>
+          <a:bodyPr wrap="none" rtlCol="0">
+            <a:spAutoFit/>
+          </a:bodyPr>
+          <a:lstStyle/>
+          <a:p>
+            <a:r>
+              <a:rPr lang="en-US" dirty="0" smtClean="0"/>
+              <a:t>File hierarchy,</a:t>
+            </a:r>
+          </a:p>
+          <a:p>
+            <a:r>
+              <a:rPr lang="en-US" dirty="0" smtClean="0"/>
+              <a:t>permission</a:t>
+            </a:r>
+            <a:endParaRPr lang="en-IN" dirty="0"/>
+          </a:p>
+        </p:txBody>
+      </p:sp>
+      <p:sp>
+        <p:nvSpPr>
+          <p:cNvPr id="160" name="TextBox 159"/>
+          <p:cNvSpPr txBox="1"/>
+          <p:nvPr/>
+        </p:nvSpPr>
+        <p:spPr>
+          <a:xfrm>
+            <a:off x="6732240" y="2204864"/>
+            <a:ext cx="947760" cy="1200329"/>
+          </a:xfrm>
+          <a:prstGeom prst="rect">
+            <a:avLst/>
+          </a:prstGeom>
+          <a:noFill/>
+        </p:spPr>
+        <p:txBody>
+          <a:bodyPr wrap="none" rtlCol="0">
+            <a:spAutoFit/>
+          </a:bodyPr>
+          <a:lstStyle/>
+          <a:p>
+            <a:r>
+              <a:rPr lang="en-US" dirty="0" smtClean="0"/>
+              <a:t>Provide </a:t>
+            </a:r>
+          </a:p>
+          <a:p>
+            <a:r>
+              <a:rPr lang="en-US" dirty="0" smtClean="0"/>
+              <a:t>user,</a:t>
+            </a:r>
+          </a:p>
+          <a:p>
+            <a:r>
+              <a:rPr lang="en-US" dirty="0" smtClean="0"/>
+              <a:t>profile </a:t>
+            </a:r>
+          </a:p>
+          <a:p>
+            <a:r>
+              <a:rPr lang="en-US" dirty="0" smtClean="0"/>
+              <a:t>details</a:t>
+            </a:r>
+            <a:endParaRPr lang="en-IN" dirty="0"/>
+          </a:p>
+        </p:txBody>
+      </p:sp>
+      <p:sp>
+        <p:nvSpPr>
+          <p:cNvPr id="161" name="TextBox 160"/>
+          <p:cNvSpPr txBox="1"/>
+          <p:nvPr/>
+        </p:nvSpPr>
+        <p:spPr>
+          <a:xfrm>
+            <a:off x="4860032" y="1484784"/>
+            <a:ext cx="1233799" cy="1200329"/>
+          </a:xfrm>
+          <a:prstGeom prst="rect">
+            <a:avLst/>
+          </a:prstGeom>
+          <a:noFill/>
+        </p:spPr>
+        <p:txBody>
+          <a:bodyPr wrap="none" rtlCol="0">
+            <a:spAutoFit/>
+          </a:bodyPr>
+          <a:lstStyle/>
+          <a:p>
+            <a:r>
+              <a:rPr lang="en-US" dirty="0" smtClean="0"/>
+              <a:t>File details </a:t>
+            </a:r>
+          </a:p>
+          <a:p>
+            <a:r>
+              <a:rPr lang="en-US" dirty="0" smtClean="0"/>
+              <a:t>and info, </a:t>
+            </a:r>
+          </a:p>
+          <a:p>
+            <a:r>
+              <a:rPr lang="en-US" dirty="0" smtClean="0"/>
+              <a:t>Access</a:t>
+            </a:r>
+          </a:p>
+          <a:p>
+            <a:r>
+              <a:rPr lang="en-US" dirty="0" smtClean="0"/>
+              <a:t>user info</a:t>
+            </a:r>
+            <a:endParaRPr lang="en-IN" dirty="0"/>
+          </a:p>
+        </p:txBody>
+      </p:sp>
+      <p:sp>
+        <p:nvSpPr>
+          <p:cNvPr id="162" name="TextBox 161"/>
+          <p:cNvSpPr txBox="1"/>
+          <p:nvPr/>
+        </p:nvSpPr>
+        <p:spPr>
+          <a:xfrm>
+            <a:off x="3419872" y="1569566"/>
+            <a:ext cx="1517980" cy="923330"/>
+          </a:xfrm>
+          <a:prstGeom prst="rect">
+            <a:avLst/>
+          </a:prstGeom>
+          <a:noFill/>
+        </p:spPr>
+        <p:txBody>
+          <a:bodyPr wrap="none" rtlCol="0">
+            <a:spAutoFit/>
+          </a:bodyPr>
+          <a:lstStyle/>
+          <a:p>
+            <a:r>
+              <a:rPr lang="en-US" dirty="0" smtClean="0"/>
+              <a:t>User info, </a:t>
+            </a:r>
+          </a:p>
+          <a:p>
+            <a:r>
+              <a:rPr lang="en-US" dirty="0" smtClean="0"/>
+              <a:t>device details,</a:t>
+            </a:r>
+          </a:p>
+          <a:p>
+            <a:r>
+              <a:rPr lang="en-US" dirty="0" smtClean="0"/>
+              <a:t>data info</a:t>
+            </a:r>
+            <a:endParaRPr lang="en-IN" dirty="0"/>
+          </a:p>
+        </p:txBody>
+      </p:sp>
+      <p:sp>
+        <p:nvSpPr>
+          <p:cNvPr id="163" name="TextBox 162"/>
+          <p:cNvSpPr txBox="1"/>
+          <p:nvPr/>
+        </p:nvSpPr>
+        <p:spPr>
+          <a:xfrm>
+            <a:off x="1331640" y="3717032"/>
+            <a:ext cx="993092" cy="369332"/>
+          </a:xfrm>
+          <a:prstGeom prst="rect">
+            <a:avLst/>
+          </a:prstGeom>
+          <a:noFill/>
+        </p:spPr>
+        <p:txBody>
+          <a:bodyPr wrap="none" rtlCol="0">
+            <a:spAutoFit/>
+          </a:bodyPr>
+          <a:lstStyle/>
+          <a:p>
+            <a:r>
+              <a:rPr lang="en-US" dirty="0" smtClean="0"/>
+              <a:t>Register </a:t>
+            </a:r>
+            <a:endParaRPr lang="en-IN" dirty="0"/>
+          </a:p>
+        </p:txBody>
+      </p:sp>
+      <p:sp>
+        <p:nvSpPr>
+          <p:cNvPr id="164" name="TextBox 163"/>
+          <p:cNvSpPr txBox="1"/>
+          <p:nvPr/>
+        </p:nvSpPr>
+        <p:spPr>
+          <a:xfrm>
+            <a:off x="2555776" y="4221088"/>
+            <a:ext cx="1268296" cy="646331"/>
+          </a:xfrm>
+          <a:prstGeom prst="rect">
+            <a:avLst/>
+          </a:prstGeom>
+          <a:noFill/>
+        </p:spPr>
+        <p:txBody>
+          <a:bodyPr wrap="none" rtlCol="0">
+            <a:spAutoFit/>
+          </a:bodyPr>
+          <a:lstStyle/>
+          <a:p>
+            <a:r>
+              <a:rPr lang="en-US" dirty="0" smtClean="0"/>
+              <a:t>Provide </a:t>
+            </a:r>
+          </a:p>
+          <a:p>
+            <a:r>
+              <a:rPr lang="en-US" dirty="0" smtClean="0"/>
+              <a:t>permission </a:t>
+            </a:r>
+            <a:endParaRPr lang="en-IN" dirty="0"/>
+          </a:p>
+        </p:txBody>
+      </p:sp>
+      <p:sp>
+        <p:nvSpPr>
+          <p:cNvPr id="165" name="TextBox 164"/>
+          <p:cNvSpPr txBox="1"/>
+          <p:nvPr/>
+        </p:nvSpPr>
+        <p:spPr>
+          <a:xfrm>
+            <a:off x="2555776" y="4797152"/>
+            <a:ext cx="1397498" cy="369332"/>
+          </a:xfrm>
+          <a:prstGeom prst="rect">
+            <a:avLst/>
+          </a:prstGeom>
+          <a:noFill/>
+        </p:spPr>
+        <p:txBody>
+          <a:bodyPr wrap="none" rtlCol="0">
+            <a:spAutoFit/>
+          </a:bodyPr>
+          <a:lstStyle/>
+          <a:p>
+            <a:r>
+              <a:rPr lang="en-US" dirty="0" smtClean="0"/>
+              <a:t>Authenticate</a:t>
+            </a:r>
+            <a:endParaRPr lang="en-IN" dirty="0"/>
+          </a:p>
+        </p:txBody>
+      </p:sp>
+      <p:sp>
+        <p:nvSpPr>
+          <p:cNvPr id="169" name="TextBox 168"/>
+          <p:cNvSpPr txBox="1"/>
+          <p:nvPr/>
+        </p:nvSpPr>
+        <p:spPr>
+          <a:xfrm>
+            <a:off x="1464976" y="2566645"/>
+            <a:ext cx="1882888" cy="646331"/>
+          </a:xfrm>
+          <a:prstGeom prst="rect">
+            <a:avLst/>
+          </a:prstGeom>
+          <a:noFill/>
+        </p:spPr>
+        <p:txBody>
+          <a:bodyPr wrap="none" rtlCol="0">
+            <a:spAutoFit/>
+          </a:bodyPr>
+          <a:lstStyle/>
+          <a:p>
+            <a:r>
+              <a:rPr lang="en-US" dirty="0" smtClean="0"/>
+              <a:t>Device info, </a:t>
+            </a:r>
+          </a:p>
+          <a:p>
+            <a:r>
+              <a:rPr lang="en-US" dirty="0" smtClean="0"/>
+              <a:t>File system details</a:t>
+            </a:r>
+            <a:endParaRPr lang="en-IN" dirty="0"/>
+          </a:p>
+        </p:txBody>
+      </p:sp>
+      <p:sp>
+        <p:nvSpPr>
+          <p:cNvPr id="45" name="Oval 44"/>
+          <p:cNvSpPr/>
+          <p:nvPr/>
+        </p:nvSpPr>
+        <p:spPr>
+          <a:xfrm>
+            <a:off x="395536" y="4653136"/>
+            <a:ext cx="1728192" cy="1152128"/>
+          </a:xfrm>
+          <a:prstGeom prst="ellipse">
+            <a:avLst/>
+          </a:prstGeom>
+          <a:noFill/>
+          <a:ln>
+            <a:solidFill>
+              <a:schemeClr val="tx1"/>
+            </a:solidFill>
+          </a:ln>
+        </p:spPr>
+        <p:style>
+          <a:lnRef idx="2">
+            <a:schemeClr val="accent1">
+              <a:shade val="50000"/>
+            </a:schemeClr>
+          </a:lnRef>
+          <a:fillRef idx="1">
+            <a:schemeClr val="accent1"/>
+          </a:fillRef>
+          <a:effectRef idx="0">
+            <a:schemeClr val="accent1"/>
+          </a:effectRef>
+          <a:fontRef idx="minor">
+            <a:schemeClr val="lt1"/>
+          </a:fontRef>
+        </p:style>
+        <p:txBody>
+          <a:bodyPr rtlCol="0" anchor="ctr"/>
+          <a:lstStyle/>
+          <a:p>
+            <a:pPr algn="ctr"/>
+            <a:endParaRPr lang="en-IN"/>
+          </a:p>
+        </p:txBody>
+      </p:sp>
+      <p:sp>
+        <p:nvSpPr>
+          <p:cNvPr id="46" name="Oval 45"/>
+          <p:cNvSpPr/>
+          <p:nvPr/>
+        </p:nvSpPr>
+        <p:spPr>
+          <a:xfrm>
+            <a:off x="3851920" y="5445224"/>
+            <a:ext cx="1728192" cy="1152128"/>
+          </a:xfrm>
+          <a:prstGeom prst="ellipse">
+            <a:avLst/>
+          </a:prstGeom>
+          <a:noFill/>
+          <a:ln>
+            <a:solidFill>
+              <a:schemeClr val="tx1"/>
+            </a:solidFill>
+          </a:ln>
+        </p:spPr>
+        <p:style>
+          <a:lnRef idx="2">
+            <a:schemeClr val="accent1">
+              <a:shade val="50000"/>
+            </a:schemeClr>
+          </a:lnRef>
+          <a:fillRef idx="1">
+            <a:schemeClr val="accent1"/>
+          </a:fillRef>
+          <a:effectRef idx="0">
+            <a:schemeClr val="accent1"/>
+          </a:effectRef>
+          <a:fontRef idx="minor">
+            <a:schemeClr val="lt1"/>
+          </a:fontRef>
+        </p:style>
+        <p:txBody>
+          <a:bodyPr rtlCol="0" anchor="ctr"/>
+          <a:lstStyle/>
+          <a:p>
+            <a:pPr algn="ctr"/>
+            <a:endParaRPr lang="en-IN"/>
+          </a:p>
+        </p:txBody>
+      </p:sp>
+      <p:sp>
+        <p:nvSpPr>
+          <p:cNvPr id="47" name="Oval 46"/>
+          <p:cNvSpPr/>
+          <p:nvPr/>
+        </p:nvSpPr>
+        <p:spPr>
+          <a:xfrm>
+            <a:off x="539552" y="1412776"/>
+            <a:ext cx="1728192" cy="1152128"/>
+          </a:xfrm>
+          <a:prstGeom prst="ellipse">
+            <a:avLst/>
+          </a:prstGeom>
+          <a:noFill/>
+          <a:ln>
+            <a:solidFill>
+              <a:schemeClr val="tx1"/>
+            </a:solidFill>
+          </a:ln>
+        </p:spPr>
+        <p:style>
+          <a:lnRef idx="2">
+            <a:schemeClr val="accent1">
+              <a:shade val="50000"/>
+            </a:schemeClr>
+          </a:lnRef>
+          <a:fillRef idx="1">
+            <a:schemeClr val="accent1"/>
+          </a:fillRef>
+          <a:effectRef idx="0">
+            <a:schemeClr val="accent1"/>
+          </a:effectRef>
+          <a:fontRef idx="minor">
+            <a:schemeClr val="lt1"/>
+          </a:fontRef>
+        </p:style>
+        <p:txBody>
+          <a:bodyPr rtlCol="0" anchor="ctr"/>
+          <a:lstStyle/>
+          <a:p>
+            <a:pPr algn="ctr"/>
+            <a:endParaRPr lang="en-IN" dirty="0"/>
+          </a:p>
+        </p:txBody>
+      </p:sp>
+      <p:sp>
+        <p:nvSpPr>
+          <p:cNvPr id="48" name="Oval 47"/>
+          <p:cNvSpPr/>
+          <p:nvPr/>
+        </p:nvSpPr>
+        <p:spPr>
+          <a:xfrm>
+            <a:off x="6588224" y="4293096"/>
+            <a:ext cx="1728192" cy="1152128"/>
+          </a:xfrm>
+          <a:prstGeom prst="ellipse">
+            <a:avLst/>
+          </a:prstGeom>
+          <a:noFill/>
+          <a:ln>
+            <a:solidFill>
+              <a:schemeClr val="tx1"/>
+            </a:solidFill>
+          </a:ln>
+        </p:spPr>
+        <p:style>
+          <a:lnRef idx="2">
+            <a:schemeClr val="accent1">
+              <a:shade val="50000"/>
+            </a:schemeClr>
+          </a:lnRef>
+          <a:fillRef idx="1">
+            <a:schemeClr val="accent1"/>
+          </a:fillRef>
+          <a:effectRef idx="0">
+            <a:schemeClr val="accent1"/>
+          </a:effectRef>
+          <a:fontRef idx="minor">
+            <a:schemeClr val="lt1"/>
+          </a:fontRef>
+        </p:style>
+        <p:txBody>
+          <a:bodyPr rtlCol="0" anchor="ctr"/>
+          <a:lstStyle/>
+          <a:p>
+            <a:pPr algn="ctr"/>
+            <a:endParaRPr lang="en-IN" dirty="0"/>
+          </a:p>
+        </p:txBody>
+      </p:sp>
+      <p:sp>
+        <p:nvSpPr>
+          <p:cNvPr id="49" name="Oval 48"/>
+          <p:cNvSpPr/>
+          <p:nvPr/>
+        </p:nvSpPr>
+        <p:spPr>
+          <a:xfrm>
+            <a:off x="6804248" y="980728"/>
+            <a:ext cx="1728192" cy="1152128"/>
+          </a:xfrm>
+          <a:prstGeom prst="ellipse">
+            <a:avLst/>
+          </a:prstGeom>
+          <a:noFill/>
+          <a:ln>
+            <a:solidFill>
+              <a:schemeClr val="tx1"/>
+            </a:solidFill>
+          </a:ln>
+        </p:spPr>
+        <p:style>
+          <a:lnRef idx="2">
+            <a:schemeClr val="accent1">
+              <a:shade val="50000"/>
+            </a:schemeClr>
+          </a:lnRef>
+          <a:fillRef idx="1">
+            <a:schemeClr val="accent1"/>
+          </a:fillRef>
+          <a:effectRef idx="0">
+            <a:schemeClr val="accent1"/>
+          </a:effectRef>
+          <a:fontRef idx="minor">
+            <a:schemeClr val="lt1"/>
+          </a:fontRef>
+        </p:style>
+        <p:txBody>
+          <a:bodyPr rtlCol="0" anchor="ctr"/>
+          <a:lstStyle/>
+          <a:p>
+            <a:pPr algn="ctr"/>
             <a:endParaRPr lang="en-IN" dirty="0"/>
           </a:p>
         </p:txBody>

</xml_diff>